<commit_message>
Enhance the main document by refining the discussion on donor engagement interventions, emphasizing the differences between promoting donor registration and preventing dropout among registered donors. Update references to align with the target population's altruistic characteristics and clarify the implications of the matching difficulty message. Render updated Rmd and LaTeX files.
</commit_message>
<xml_diff>
--- a/image/flowchart.pptx
+++ b/image/flowchart.pptx
@@ -104,6 +104,11 @@
       </a:defRPr>
     </a:lvl9pPr>
   </p:defaultTextStyle>
+  <p:extLst>
+    <p:ext uri="{EFAFB233-063F-42B5-8137-9DF3F51BA10A}">
+      <p15:sldGuideLst xmlns:p15="http://schemas.microsoft.com/office/powerpoint/2012/main"/>
+    </p:ext>
+  </p:extLst>
 </p:presentation>
 </file>
 
@@ -254,7 +259,7 @@
           <a:p>
             <a:fld id="{60C89CFB-3BD4-45D4-8FCC-79850387BF7C}" type="datetimeFigureOut">
               <a:rPr kumimoji="1" lang="ja-JP" altLang="en-US" smtClean="0"/>
-              <a:t>2025/10/25</a:t>
+              <a:t>2025/10/27</a:t>
             </a:fld>
             <a:endParaRPr kumimoji="1" lang="ja-JP" altLang="en-US"/>
           </a:p>
@@ -484,7 +489,7 @@
           <a:p>
             <a:fld id="{60C89CFB-3BD4-45D4-8FCC-79850387BF7C}" type="datetimeFigureOut">
               <a:rPr kumimoji="1" lang="ja-JP" altLang="en-US" smtClean="0"/>
-              <a:t>2025/10/25</a:t>
+              <a:t>2025/10/27</a:t>
             </a:fld>
             <a:endParaRPr kumimoji="1" lang="ja-JP" altLang="en-US"/>
           </a:p>
@@ -724,7 +729,7 @@
           <a:p>
             <a:fld id="{60C89CFB-3BD4-45D4-8FCC-79850387BF7C}" type="datetimeFigureOut">
               <a:rPr kumimoji="1" lang="ja-JP" altLang="en-US" smtClean="0"/>
-              <a:t>2025/10/25</a:t>
+              <a:t>2025/10/27</a:t>
             </a:fld>
             <a:endParaRPr kumimoji="1" lang="ja-JP" altLang="en-US"/>
           </a:p>
@@ -954,7 +959,7 @@
           <a:p>
             <a:fld id="{60C89CFB-3BD4-45D4-8FCC-79850387BF7C}" type="datetimeFigureOut">
               <a:rPr kumimoji="1" lang="ja-JP" altLang="en-US" smtClean="0"/>
-              <a:t>2025/10/25</a:t>
+              <a:t>2025/10/27</a:t>
             </a:fld>
             <a:endParaRPr kumimoji="1" lang="ja-JP" altLang="en-US"/>
           </a:p>
@@ -1229,7 +1234,7 @@
           <a:p>
             <a:fld id="{60C89CFB-3BD4-45D4-8FCC-79850387BF7C}" type="datetimeFigureOut">
               <a:rPr kumimoji="1" lang="ja-JP" altLang="en-US" smtClean="0"/>
-              <a:t>2025/10/25</a:t>
+              <a:t>2025/10/27</a:t>
             </a:fld>
             <a:endParaRPr kumimoji="1" lang="ja-JP" altLang="en-US"/>
           </a:p>
@@ -1558,7 +1563,7 @@
           <a:p>
             <a:fld id="{60C89CFB-3BD4-45D4-8FCC-79850387BF7C}" type="datetimeFigureOut">
               <a:rPr kumimoji="1" lang="ja-JP" altLang="en-US" smtClean="0"/>
-              <a:t>2025/10/25</a:t>
+              <a:t>2025/10/27</a:t>
             </a:fld>
             <a:endParaRPr kumimoji="1" lang="ja-JP" altLang="en-US"/>
           </a:p>
@@ -2034,7 +2039,7 @@
           <a:p>
             <a:fld id="{60C89CFB-3BD4-45D4-8FCC-79850387BF7C}" type="datetimeFigureOut">
               <a:rPr kumimoji="1" lang="ja-JP" altLang="en-US" smtClean="0"/>
-              <a:t>2025/10/25</a:t>
+              <a:t>2025/10/27</a:t>
             </a:fld>
             <a:endParaRPr kumimoji="1" lang="ja-JP" altLang="en-US"/>
           </a:p>
@@ -2175,7 +2180,7 @@
           <a:p>
             <a:fld id="{60C89CFB-3BD4-45D4-8FCC-79850387BF7C}" type="datetimeFigureOut">
               <a:rPr kumimoji="1" lang="ja-JP" altLang="en-US" smtClean="0"/>
-              <a:t>2025/10/25</a:t>
+              <a:t>2025/10/27</a:t>
             </a:fld>
             <a:endParaRPr kumimoji="1" lang="ja-JP" altLang="en-US"/>
           </a:p>
@@ -2288,7 +2293,7 @@
           <a:p>
             <a:fld id="{60C89CFB-3BD4-45D4-8FCC-79850387BF7C}" type="datetimeFigureOut">
               <a:rPr kumimoji="1" lang="ja-JP" altLang="en-US" smtClean="0"/>
-              <a:t>2025/10/25</a:t>
+              <a:t>2025/10/27</a:t>
             </a:fld>
             <a:endParaRPr kumimoji="1" lang="ja-JP" altLang="en-US"/>
           </a:p>
@@ -2631,7 +2636,7 @@
           <a:p>
             <a:fld id="{60C89CFB-3BD4-45D4-8FCC-79850387BF7C}" type="datetimeFigureOut">
               <a:rPr kumimoji="1" lang="ja-JP" altLang="en-US" smtClean="0"/>
-              <a:t>2025/10/25</a:t>
+              <a:t>2025/10/27</a:t>
             </a:fld>
             <a:endParaRPr kumimoji="1" lang="ja-JP" altLang="en-US"/>
           </a:p>
@@ -2919,7 +2924,7 @@
           <a:p>
             <a:fld id="{60C89CFB-3BD4-45D4-8FCC-79850387BF7C}" type="datetimeFigureOut">
               <a:rPr kumimoji="1" lang="ja-JP" altLang="en-US" smtClean="0"/>
-              <a:t>2025/10/25</a:t>
+              <a:t>2025/10/27</a:t>
             </a:fld>
             <a:endParaRPr kumimoji="1" lang="ja-JP" altLang="en-US"/>
           </a:p>
@@ -3192,7 +3197,7 @@
           <a:p>
             <a:fld id="{60C89CFB-3BD4-45D4-8FCC-79850387BF7C}" type="datetimeFigureOut">
               <a:rPr kumimoji="1" lang="ja-JP" altLang="en-US" smtClean="0"/>
-              <a:t>2025/10/25</a:t>
+              <a:t>2025/10/27</a:t>
             </a:fld>
             <a:endParaRPr kumimoji="1" lang="ja-JP" altLang="en-US"/>
           </a:p>
@@ -3875,7 +3880,27 @@
                   <a:latin typeface="Times New Roman" panose="02020603050405020304" pitchFamily="18" charset="0"/>
                   <a:cs typeface="Times New Roman" panose="02020603050405020304" pitchFamily="18" charset="0"/>
                 </a:rPr>
-                <a:t>A physician selected up to 10 matched donors from the list of candidates provided by JMDP.</a:t>
+                <a:t>A physician selected up to 10 matched donors</a:t>
+              </a:r>
+              <a:r>
+                <a:rPr lang="ja-JP" altLang="en-US" dirty="0">
+                  <a:solidFill>
+                    <a:schemeClr val="tx1"/>
+                  </a:solidFill>
+                  <a:latin typeface="Times New Roman" panose="02020603050405020304" pitchFamily="18" charset="0"/>
+                  <a:cs typeface="Times New Roman" panose="02020603050405020304" pitchFamily="18" charset="0"/>
+                </a:rPr>
+                <a:t> </a:t>
+              </a:r>
+              <a:r>
+                <a:rPr lang="en-US" altLang="ja-JP" dirty="0">
+                  <a:solidFill>
+                    <a:schemeClr val="tx1"/>
+                  </a:solidFill>
+                  <a:latin typeface="Times New Roman" panose="02020603050405020304" pitchFamily="18" charset="0"/>
+                  <a:cs typeface="Times New Roman" panose="02020603050405020304" pitchFamily="18" charset="0"/>
+                </a:rPr>
+                <a:t>per a patient from the list of candidates provided by JMDP.</a:t>
               </a:r>
             </a:p>
           </p:txBody>

</xml_diff>

<commit_message>
Refine the main document to enhance clarity and readability. Render updated Rmd and LaTeX files.
</commit_message>
<xml_diff>
--- a/image/flowchart.pptx
+++ b/image/flowchart.pptx
@@ -197,7 +197,7 @@
           <a:p>
             <a:fld id="{AE391BAF-91F8-4B50-BA74-917754362F3D}" type="datetimeFigureOut">
               <a:rPr kumimoji="1" lang="ja-JP" altLang="en-US" smtClean="0"/>
-              <a:t>2025/10/28</a:t>
+              <a:t>2025/10/29</a:t>
             </a:fld>
             <a:endParaRPr kumimoji="1" lang="ja-JP" altLang="en-US"/>
           </a:p>
@@ -711,7 +711,7 @@
           <a:p>
             <a:fld id="{60C89CFB-3BD4-45D4-8FCC-79850387BF7C}" type="datetimeFigureOut">
               <a:rPr kumimoji="1" lang="ja-JP" altLang="en-US" smtClean="0"/>
-              <a:t>2025/10/28</a:t>
+              <a:t>2025/10/29</a:t>
             </a:fld>
             <a:endParaRPr kumimoji="1" lang="ja-JP" altLang="en-US"/>
           </a:p>
@@ -913,7 +913,7 @@
           <a:p>
             <a:fld id="{60C89CFB-3BD4-45D4-8FCC-79850387BF7C}" type="datetimeFigureOut">
               <a:rPr kumimoji="1" lang="ja-JP" altLang="en-US" smtClean="0"/>
-              <a:t>2025/10/28</a:t>
+              <a:t>2025/10/29</a:t>
             </a:fld>
             <a:endParaRPr kumimoji="1" lang="ja-JP" altLang="en-US"/>
           </a:p>
@@ -1125,7 +1125,7 @@
           <a:p>
             <a:fld id="{60C89CFB-3BD4-45D4-8FCC-79850387BF7C}" type="datetimeFigureOut">
               <a:rPr kumimoji="1" lang="ja-JP" altLang="en-US" smtClean="0"/>
-              <a:t>2025/10/28</a:t>
+              <a:t>2025/10/29</a:t>
             </a:fld>
             <a:endParaRPr kumimoji="1" lang="ja-JP" altLang="en-US"/>
           </a:p>
@@ -1327,7 +1327,7 @@
           <a:p>
             <a:fld id="{60C89CFB-3BD4-45D4-8FCC-79850387BF7C}" type="datetimeFigureOut">
               <a:rPr kumimoji="1" lang="ja-JP" altLang="en-US" smtClean="0"/>
-              <a:t>2025/10/28</a:t>
+              <a:t>2025/10/29</a:t>
             </a:fld>
             <a:endParaRPr kumimoji="1" lang="ja-JP" altLang="en-US"/>
           </a:p>
@@ -1573,7 +1573,7 @@
           <a:p>
             <a:fld id="{60C89CFB-3BD4-45D4-8FCC-79850387BF7C}" type="datetimeFigureOut">
               <a:rPr kumimoji="1" lang="ja-JP" altLang="en-US" smtClean="0"/>
-              <a:t>2025/10/28</a:t>
+              <a:t>2025/10/29</a:t>
             </a:fld>
             <a:endParaRPr kumimoji="1" lang="ja-JP" altLang="en-US"/>
           </a:p>
@@ -1869,7 +1869,7 @@
           <a:p>
             <a:fld id="{60C89CFB-3BD4-45D4-8FCC-79850387BF7C}" type="datetimeFigureOut">
               <a:rPr kumimoji="1" lang="ja-JP" altLang="en-US" smtClean="0"/>
-              <a:t>2025/10/28</a:t>
+              <a:t>2025/10/29</a:t>
             </a:fld>
             <a:endParaRPr kumimoji="1" lang="ja-JP" altLang="en-US"/>
           </a:p>
@@ -2300,7 +2300,7 @@
           <a:p>
             <a:fld id="{60C89CFB-3BD4-45D4-8FCC-79850387BF7C}" type="datetimeFigureOut">
               <a:rPr kumimoji="1" lang="ja-JP" altLang="en-US" smtClean="0"/>
-              <a:t>2025/10/28</a:t>
+              <a:t>2025/10/29</a:t>
             </a:fld>
             <a:endParaRPr kumimoji="1" lang="ja-JP" altLang="en-US"/>
           </a:p>
@@ -2418,7 +2418,7 @@
           <a:p>
             <a:fld id="{60C89CFB-3BD4-45D4-8FCC-79850387BF7C}" type="datetimeFigureOut">
               <a:rPr kumimoji="1" lang="ja-JP" altLang="en-US" smtClean="0"/>
-              <a:t>2025/10/28</a:t>
+              <a:t>2025/10/29</a:t>
             </a:fld>
             <a:endParaRPr kumimoji="1" lang="ja-JP" altLang="en-US"/>
           </a:p>
@@ -2513,7 +2513,7 @@
           <a:p>
             <a:fld id="{60C89CFB-3BD4-45D4-8FCC-79850387BF7C}" type="datetimeFigureOut">
               <a:rPr kumimoji="1" lang="ja-JP" altLang="en-US" smtClean="0"/>
-              <a:t>2025/10/28</a:t>
+              <a:t>2025/10/29</a:t>
             </a:fld>
             <a:endParaRPr kumimoji="1" lang="ja-JP" altLang="en-US"/>
           </a:p>
@@ -2822,7 +2822,7 @@
           <a:p>
             <a:fld id="{60C89CFB-3BD4-45D4-8FCC-79850387BF7C}" type="datetimeFigureOut">
               <a:rPr kumimoji="1" lang="ja-JP" altLang="en-US" smtClean="0"/>
-              <a:t>2025/10/28</a:t>
+              <a:t>2025/10/29</a:t>
             </a:fld>
             <a:endParaRPr kumimoji="1" lang="ja-JP" altLang="en-US"/>
           </a:p>
@@ -3079,7 +3079,7 @@
           <a:p>
             <a:fld id="{60C89CFB-3BD4-45D4-8FCC-79850387BF7C}" type="datetimeFigureOut">
               <a:rPr kumimoji="1" lang="ja-JP" altLang="en-US" smtClean="0"/>
-              <a:t>2025/10/28</a:t>
+              <a:t>2025/10/29</a:t>
             </a:fld>
             <a:endParaRPr kumimoji="1" lang="ja-JP" altLang="en-US"/>
           </a:p>
@@ -3324,7 +3324,7 @@
           <a:p>
             <a:fld id="{60C89CFB-3BD4-45D4-8FCC-79850387BF7C}" type="datetimeFigureOut">
               <a:rPr kumimoji="1" lang="ja-JP" altLang="en-US" smtClean="0"/>
-              <a:t>2025/10/28</a:t>
+              <a:t>2025/10/29</a:t>
             </a:fld>
             <a:endParaRPr kumimoji="1" lang="ja-JP" altLang="en-US"/>
           </a:p>
@@ -3744,9 +3744,9 @@
         <p:grpSpPr>
           <a:xfrm>
             <a:off x="280799" y="212437"/>
-            <a:ext cx="8672398" cy="6416108"/>
+            <a:ext cx="8672397" cy="6416108"/>
             <a:chOff x="280799" y="212437"/>
-            <a:chExt cx="8672398" cy="6416108"/>
+            <a:chExt cx="8672397" cy="6416108"/>
           </a:xfrm>
         </p:grpSpPr>
         <p:sp>
@@ -3763,8 +3763,8 @@
           </p:nvSpPr>
           <p:spPr>
             <a:xfrm>
-              <a:off x="280802" y="1151296"/>
-              <a:ext cx="5168266" cy="716315"/>
+              <a:off x="280800" y="1107785"/>
+              <a:ext cx="5168266" cy="583637"/>
             </a:xfrm>
             <a:prstGeom prst="roundRect">
               <a:avLst/>
@@ -3820,7 +3820,7 @@
                   <a:latin typeface="Times New Roman" panose="02020603050405020304" pitchFamily="18" charset="0"/>
                   <a:cs typeface="Times New Roman" panose="02020603050405020304" pitchFamily="18" charset="0"/>
                 </a:rPr>
-                <a:t>The JMDP office sent out an HLA match letter to matched donors from September 2021 to February 2022.</a:t>
+                <a:t>The JMDP office sent out an HLA match letter to matched donors.</a:t>
               </a:r>
             </a:p>
           </p:txBody>
@@ -4024,9 +4024,9 @@
             <p:nvPr/>
           </p:nvCxnSpPr>
           <p:spPr>
-            <a:xfrm>
-              <a:off x="2864935" y="928751"/>
-              <a:ext cx="0" cy="222545"/>
+            <a:xfrm flipH="1">
+              <a:off x="2864933" y="928751"/>
+              <a:ext cx="2" cy="179034"/>
             </a:xfrm>
             <a:prstGeom prst="straightConnector1">
               <a:avLst/>
@@ -4112,7 +4112,7 @@
                   <a:latin typeface="Times New Roman" panose="02020603050405020304" pitchFamily="18" charset="0"/>
                   <a:cs typeface="Times New Roman" panose="02020603050405020304" pitchFamily="18" charset="0"/>
                 </a:rPr>
-                <a:t>CT (N = 2,651)</a:t>
+                <a:t>CT [Primary Outcome] (N = 2,651)</a:t>
               </a:r>
             </a:p>
             <a:p>
@@ -4296,7 +4296,7 @@
           </p:nvSpPr>
           <p:spPr>
             <a:xfrm>
-              <a:off x="5610707" y="1419580"/>
+              <a:off x="5610707" y="1337007"/>
               <a:ext cx="3317289" cy="1047201"/>
             </a:xfrm>
             <a:prstGeom prst="roundRect">
@@ -4392,7 +4392,7 @@
           <p:spPr>
             <a:xfrm>
               <a:off x="280799" y="2083863"/>
-              <a:ext cx="5168267" cy="716696"/>
+              <a:ext cx="5168267" cy="579221"/>
             </a:xfrm>
             <a:prstGeom prst="roundRect">
               <a:avLst/>
@@ -4448,7 +4448,7 @@
                   <a:latin typeface="Times New Roman" panose="02020603050405020304" pitchFamily="18" charset="0"/>
                   <a:cs typeface="Times New Roman" panose="02020603050405020304" pitchFamily="18" charset="0"/>
                 </a:rPr>
-                <a:t>Completed or interrupted coordination involving a matched donor who lived in Japan.</a:t>
+                <a:t>Coordination involving a matched donor who lived in Japan.</a:t>
               </a:r>
             </a:p>
           </p:txBody>
@@ -4470,9 +4470,9 @@
             <p:nvPr/>
           </p:nvCxnSpPr>
           <p:spPr>
-            <a:xfrm flipH="1">
-              <a:off x="2864933" y="1867611"/>
-              <a:ext cx="2" cy="216252"/>
+            <a:xfrm>
+              <a:off x="2864933" y="1691422"/>
+              <a:ext cx="0" cy="392441"/>
             </a:xfrm>
             <a:prstGeom prst="straightConnector1">
               <a:avLst/>
@@ -4517,7 +4517,7 @@
           </p:nvCxnSpPr>
           <p:spPr>
             <a:xfrm flipV="1">
-              <a:off x="2864932" y="1943181"/>
+              <a:off x="2864932" y="1860608"/>
               <a:ext cx="2745775" cy="1472"/>
             </a:xfrm>
             <a:prstGeom prst="straightConnector1">
@@ -4564,8 +4564,8 @@
           </p:nvCxnSpPr>
           <p:spPr>
             <a:xfrm>
-              <a:off x="2864933" y="2800559"/>
-              <a:ext cx="0" cy="473542"/>
+              <a:off x="2864933" y="2663084"/>
+              <a:ext cx="0" cy="611017"/>
             </a:xfrm>
             <a:prstGeom prst="straightConnector1">
               <a:avLst/>
@@ -4748,7 +4748,7 @@
           </p:nvSpPr>
           <p:spPr>
             <a:xfrm>
-              <a:off x="5610707" y="2542351"/>
+              <a:off x="5610706" y="2498663"/>
               <a:ext cx="3342490" cy="1150997"/>
             </a:xfrm>
             <a:prstGeom prst="roundRect">
@@ -4859,13 +4859,14 @@
             </p:cNvPr>
             <p:cNvCxnSpPr>
               <a:cxnSpLocks/>
+              <a:endCxn id="71" idx="1"/>
             </p:cNvCxnSpPr>
             <p:nvPr/>
           </p:nvCxnSpPr>
           <p:spPr>
-            <a:xfrm flipV="1">
-              <a:off x="2864931" y="3023814"/>
-              <a:ext cx="2745775" cy="1472"/>
+            <a:xfrm>
+              <a:off x="2860313" y="3074162"/>
+              <a:ext cx="2750393" cy="0"/>
             </a:xfrm>
             <a:prstGeom prst="straightConnector1">
               <a:avLst/>

</xml_diff>